<commit_message>
Final tweaks, as given Codemania 2016
</commit_message>
<xml_diff>
--- a/How I learned to stop worrying and love the zygohistomorphic prepromorphism.pptx
+++ b/How I learned to stop worrying and love the zygohistomorphic prepromorphism.pptx
@@ -29,11 +29,11 @@
     <p:sldId id="280" r:id="rId23"/>
     <p:sldId id="290" r:id="rId24"/>
     <p:sldId id="279" r:id="rId25"/>
-    <p:sldId id="281" r:id="rId26"/>
-    <p:sldId id="282" r:id="rId27"/>
-    <p:sldId id="291" r:id="rId28"/>
-    <p:sldId id="283" r:id="rId29"/>
-    <p:sldId id="305" r:id="rId30"/>
+    <p:sldId id="305" r:id="rId26"/>
+    <p:sldId id="281" r:id="rId27"/>
+    <p:sldId id="282" r:id="rId28"/>
+    <p:sldId id="291" r:id="rId29"/>
+    <p:sldId id="283" r:id="rId30"/>
     <p:sldId id="306" r:id="rId31"/>
     <p:sldId id="286" r:id="rId32"/>
     <p:sldId id="289" r:id="rId33"/>
@@ -6790,14 +6790,43 @@
       </p:grpSpPr>
       <p:sp>
         <p:nvSpPr>
-          <p:cNvPr id="6" name="TextBox 5"/>
+          <p:cNvPr id="3" name="TextBox 2"/>
           <p:cNvSpPr txBox="1"/>
           <p:nvPr/>
         </p:nvSpPr>
         <p:spPr>
           <a:xfrm>
+            <a:off x="683568" y="555526"/>
+            <a:ext cx="7848872" cy="646331"/>
+          </a:xfrm>
+          <a:prstGeom prst="rect">
+            <a:avLst/>
+          </a:prstGeom>
+          <a:noFill/>
+        </p:spPr>
+        <p:txBody>
+          <a:bodyPr wrap="square" rtlCol="0">
+            <a:spAutoFit/>
+          </a:bodyPr>
+          <a:lstStyle/>
+          <a:p>
+            <a:r>
+              <a:rPr lang="en-NZ" sz="3600" b="1" dirty="0"/>
+              <a:t>Abstractions… of abstractions</a:t>
+            </a:r>
+          </a:p>
+        </p:txBody>
+      </p:sp>
+      <p:sp>
+        <p:nvSpPr>
+          <p:cNvPr id="5" name="TextBox 4"/>
+          <p:cNvSpPr txBox="1"/>
+          <p:nvPr/>
+        </p:nvSpPr>
+        <p:spPr>
+          <a:xfrm>
             <a:off x="683568" y="1478270"/>
-            <a:ext cx="7848872" cy="2677656"/>
+            <a:ext cx="7848872" cy="3108543"/>
           </a:xfrm>
           <a:prstGeom prst="rect">
             <a:avLst/>
@@ -6815,28 +6844,51 @@
                 <a:latin typeface="Consolas" panose="020B0609020204030204" pitchFamily="49" charset="0"/>
                 <a:cs typeface="Consolas" panose="020B0609020204030204" pitchFamily="49" charset="0"/>
               </a:rPr>
-              <a:t>pendingOrders.Sum</a:t>
-            </a:r>
-            <a:r>
-              <a:rPr lang="en-NZ" sz="2800" b="1" dirty="0">
-                <a:latin typeface="Consolas" panose="020B0609020204030204" pitchFamily="49" charset="0"/>
-                <a:cs typeface="Consolas" panose="020B0609020204030204" pitchFamily="49" charset="0"/>
-              </a:rPr>
-              <a:t>(o =&gt; </a:t>
+              <a:t>foreach</a:t>
+            </a:r>
+            <a:r>
+              <a:rPr lang="en-NZ" sz="2800" b="1" dirty="0">
+                <a:latin typeface="Consolas" panose="020B0609020204030204" pitchFamily="49" charset="0"/>
+                <a:cs typeface="Consolas" panose="020B0609020204030204" pitchFamily="49" charset="0"/>
+              </a:rPr>
+              <a:t> (</a:t>
             </a:r>
             <a:r>
               <a:rPr lang="en-NZ" sz="2800" b="1" dirty="0" err="1">
                 <a:latin typeface="Consolas" panose="020B0609020204030204" pitchFamily="49" charset="0"/>
                 <a:cs typeface="Consolas" panose="020B0609020204030204" pitchFamily="49" charset="0"/>
               </a:rPr>
-              <a:t>o.TotalValue</a:t>
-            </a:r>
-            <a:r>
-              <a:rPr lang="en-NZ" sz="2800" b="1" dirty="0">
-                <a:latin typeface="Consolas" panose="020B0609020204030204" pitchFamily="49" charset="0"/>
-                <a:cs typeface="Consolas" panose="020B0609020204030204" pitchFamily="49" charset="0"/>
-              </a:rPr>
-              <a:t>);</a:t>
+              <a:t>var</a:t>
+            </a:r>
+            <a:r>
+              <a:rPr lang="en-NZ" sz="2800" b="1" dirty="0">
+                <a:latin typeface="Consolas" panose="020B0609020204030204" pitchFamily="49" charset="0"/>
+                <a:cs typeface="Consolas" panose="020B0609020204030204" pitchFamily="49" charset="0"/>
+              </a:rPr>
+              <a:t> x in </a:t>
+            </a:r>
+            <a:r>
+              <a:rPr lang="en-NZ" sz="2800" b="1" dirty="0" err="1">
+                <a:latin typeface="Consolas" panose="020B0609020204030204" pitchFamily="49" charset="0"/>
+                <a:cs typeface="Consolas" panose="020B0609020204030204" pitchFamily="49" charset="0"/>
+              </a:rPr>
+              <a:t>xs</a:t>
+            </a:r>
+            <a:r>
+              <a:rPr lang="en-NZ" sz="2800" b="1" dirty="0">
+                <a:latin typeface="Consolas" panose="020B0609020204030204" pitchFamily="49" charset="0"/>
+                <a:cs typeface="Consolas" panose="020B0609020204030204" pitchFamily="49" charset="0"/>
+              </a:rPr>
+              <a:t>)</a:t>
+            </a:r>
+          </a:p>
+          <a:p>
+            <a:r>
+              <a:rPr lang="en-NZ" sz="2800" b="1" dirty="0">
+                <a:latin typeface="Consolas" panose="020B0609020204030204" pitchFamily="49" charset="0"/>
+                <a:cs typeface="Consolas" panose="020B0609020204030204" pitchFamily="49" charset="0"/>
+              </a:rPr>
+              <a:t>  result = f(result, x);</a:t>
             </a:r>
           </a:p>
           <a:p>
@@ -6863,7 +6915,7 @@
                 <a:latin typeface="Consolas" panose="020B0609020204030204" pitchFamily="49" charset="0"/>
                 <a:cs typeface="Consolas" panose="020B0609020204030204" pitchFamily="49" charset="0"/>
               </a:rPr>
-              <a:t>pendingOrders.Aggregate</a:t>
+              <a:t>xs.Aggregate</a:t>
             </a:r>
             <a:r>
               <a:rPr lang="en-NZ" sz="2800" b="1" dirty="0">
@@ -6884,16 +6936,16 @@
                 <a:latin typeface="Consolas" panose="020B0609020204030204" pitchFamily="49" charset="0"/>
                 <a:cs typeface="Consolas" panose="020B0609020204030204" pitchFamily="49" charset="0"/>
               </a:rPr>
-              <a:t>, o) =&gt;</a:t>
-            </a:r>
-          </a:p>
-          <a:p>
-            <a:r>
-              <a:rPr lang="en-NZ" sz="2800" b="1" dirty="0">
-                <a:latin typeface="Consolas" panose="020B0609020204030204" pitchFamily="49" charset="0"/>
-                <a:cs typeface="Consolas" panose="020B0609020204030204" pitchFamily="49" charset="0"/>
-              </a:rPr>
-              <a:t>  </a:t>
+              <a:t>, w) =&gt;</a:t>
+            </a:r>
+          </a:p>
+          <a:p>
+            <a:r>
+              <a:rPr lang="en-NZ" sz="2800" b="1" dirty="0">
+                <a:latin typeface="Consolas" panose="020B0609020204030204" pitchFamily="49" charset="0"/>
+                <a:cs typeface="Consolas" panose="020B0609020204030204" pitchFamily="49" charset="0"/>
+              </a:rPr>
+              <a:t>  f(</a:t>
             </a:r>
             <a:r>
               <a:rPr lang="en-NZ" sz="2800" b="1" dirty="0" err="1">
@@ -6907,63 +6959,20 @@
                 <a:latin typeface="Consolas" panose="020B0609020204030204" pitchFamily="49" charset="0"/>
                 <a:cs typeface="Consolas" panose="020B0609020204030204" pitchFamily="49" charset="0"/>
               </a:rPr>
-              <a:t> + </a:t>
-            </a:r>
-            <a:r>
-              <a:rPr lang="en-NZ" sz="2800" b="1" dirty="0" err="1">
-                <a:latin typeface="Consolas" panose="020B0609020204030204" pitchFamily="49" charset="0"/>
-                <a:cs typeface="Consolas" panose="020B0609020204030204" pitchFamily="49" charset="0"/>
-              </a:rPr>
-              <a:t>o.TotalValue</a:t>
-            </a:r>
-            <a:r>
-              <a:rPr lang="en-NZ" sz="2800" b="1" dirty="0">
-                <a:latin typeface="Consolas" panose="020B0609020204030204" pitchFamily="49" charset="0"/>
-                <a:cs typeface="Consolas" panose="020B0609020204030204" pitchFamily="49" charset="0"/>
-              </a:rPr>
-              <a:t>);</a:t>
-            </a:r>
-          </a:p>
-        </p:txBody>
-      </p:sp>
-      <p:sp>
-        <p:nvSpPr>
-          <p:cNvPr id="3" name="TextBox 2"/>
-          <p:cNvSpPr txBox="1"/>
-          <p:nvPr/>
-        </p:nvSpPr>
-        <p:spPr>
-          <a:xfrm>
-            <a:off x="683568" y="555526"/>
-            <a:ext cx="7848872" cy="646331"/>
-          </a:xfrm>
-          <a:prstGeom prst="rect">
-            <a:avLst/>
-          </a:prstGeom>
-          <a:noFill/>
-        </p:spPr>
-        <p:txBody>
-          <a:bodyPr wrap="square" rtlCol="0">
-            <a:spAutoFit/>
-          </a:bodyPr>
-          <a:lstStyle/>
-          <a:p>
-            <a:r>
-              <a:rPr lang="en-NZ" sz="3600" b="1" dirty="0"/>
-              <a:t>Abstractions… of abstractions</a:t>
-            </a:r>
-          </a:p>
-        </p:txBody>
-      </p:sp>
-      <p:sp>
-        <p:nvSpPr>
-          <p:cNvPr id="2" name="Down Arrow 1"/>
+              <a:t>, w));</a:t>
+            </a:r>
+          </a:p>
+        </p:txBody>
+      </p:sp>
+      <p:sp>
+        <p:nvSpPr>
+          <p:cNvPr id="7" name="Down Arrow 6"/>
           <p:cNvSpPr/>
           <p:nvPr/>
         </p:nvSpPr>
         <p:spPr>
           <a:xfrm>
-            <a:off x="4283968" y="2283718"/>
+            <a:off x="4283968" y="2715766"/>
             <a:ext cx="576064" cy="648072"/>
           </a:xfrm>
           <a:prstGeom prst="downArrow">
@@ -6996,7 +7005,7 @@
     </p:spTree>
     <p:extLst>
       <p:ext uri="{BB962C8B-B14F-4D97-AF65-F5344CB8AC3E}">
-        <p14:creationId xmlns:p14="http://schemas.microsoft.com/office/powerpoint/2010/main" val="3964876540"/>
+        <p14:creationId xmlns:p14="http://schemas.microsoft.com/office/powerpoint/2010/main" val="2055917948"/>
       </p:ext>
     </p:extLst>
   </p:cSld>
@@ -7053,21 +7062,21 @@
                 <a:latin typeface="Consolas" panose="020B0609020204030204" pitchFamily="49" charset="0"/>
                 <a:cs typeface="Consolas" panose="020B0609020204030204" pitchFamily="49" charset="0"/>
               </a:rPr>
-              <a:t>years.Product</a:t>
-            </a:r>
-            <a:r>
-              <a:rPr lang="en-NZ" sz="2800" b="1" dirty="0">
-                <a:latin typeface="Consolas" panose="020B0609020204030204" pitchFamily="49" charset="0"/>
-                <a:cs typeface="Consolas" panose="020B0609020204030204" pitchFamily="49" charset="0"/>
-              </a:rPr>
-              <a:t>(y =&gt; </a:t>
+              <a:t>pendingOrders.Sum</a:t>
+            </a:r>
+            <a:r>
+              <a:rPr lang="en-NZ" sz="2800" b="1" dirty="0">
+                <a:latin typeface="Consolas" panose="020B0609020204030204" pitchFamily="49" charset="0"/>
+                <a:cs typeface="Consolas" panose="020B0609020204030204" pitchFamily="49" charset="0"/>
+              </a:rPr>
+              <a:t>(o =&gt; </a:t>
             </a:r>
             <a:r>
               <a:rPr lang="en-NZ" sz="2800" b="1" dirty="0" err="1">
                 <a:latin typeface="Consolas" panose="020B0609020204030204" pitchFamily="49" charset="0"/>
                 <a:cs typeface="Consolas" panose="020B0609020204030204" pitchFamily="49" charset="0"/>
               </a:rPr>
-              <a:t>y.AnnualInflation</a:t>
+              <a:t>o.TotalValue</a:t>
             </a:r>
             <a:r>
               <a:rPr lang="en-NZ" sz="2800" b="1" dirty="0">
@@ -7101,7 +7110,7 @@
                 <a:latin typeface="Consolas" panose="020B0609020204030204" pitchFamily="49" charset="0"/>
                 <a:cs typeface="Consolas" panose="020B0609020204030204" pitchFamily="49" charset="0"/>
               </a:rPr>
-              <a:t>years.Aggregate</a:t>
+              <a:t>pendingOrders.Aggregate</a:t>
             </a:r>
             <a:r>
               <a:rPr lang="en-NZ" sz="2800" b="1" dirty="0">
@@ -7122,7 +7131,7 @@
                 <a:latin typeface="Consolas" panose="020B0609020204030204" pitchFamily="49" charset="0"/>
                 <a:cs typeface="Consolas" panose="020B0609020204030204" pitchFamily="49" charset="0"/>
               </a:rPr>
-              <a:t>, y) =&gt;</a:t>
+              <a:t>, o) =&gt;</a:t>
             </a:r>
           </a:p>
           <a:p>
@@ -7145,14 +7154,14 @@
                 <a:latin typeface="Consolas" panose="020B0609020204030204" pitchFamily="49" charset="0"/>
                 <a:cs typeface="Consolas" panose="020B0609020204030204" pitchFamily="49" charset="0"/>
               </a:rPr>
-              <a:t> * </a:t>
+              <a:t> + </a:t>
             </a:r>
             <a:r>
               <a:rPr lang="en-NZ" sz="2800" b="1" dirty="0" err="1">
                 <a:latin typeface="Consolas" panose="020B0609020204030204" pitchFamily="49" charset="0"/>
                 <a:cs typeface="Consolas" panose="020B0609020204030204" pitchFamily="49" charset="0"/>
               </a:rPr>
-              <a:t>y.AnnualInflation</a:t>
+              <a:t>o.TotalValue</a:t>
             </a:r>
             <a:r>
               <a:rPr lang="en-NZ" sz="2800" b="1" dirty="0">
@@ -7234,7 +7243,7 @@
     </p:spTree>
     <p:extLst>
       <p:ext uri="{BB962C8B-B14F-4D97-AF65-F5344CB8AC3E}">
-        <p14:creationId xmlns:p14="http://schemas.microsoft.com/office/powerpoint/2010/main" val="431260941"/>
+        <p14:creationId xmlns:p14="http://schemas.microsoft.com/office/powerpoint/2010/main" val="3964876540"/>
       </p:ext>
     </p:extLst>
   </p:cSld>
@@ -7291,14 +7300,28 @@
                 <a:latin typeface="Consolas" panose="020B0609020204030204" pitchFamily="49" charset="0"/>
                 <a:cs typeface="Consolas" panose="020B0609020204030204" pitchFamily="49" charset="0"/>
               </a:rPr>
-              <a:t>scores.Max</a:t>
-            </a:r>
-            <a:r>
-              <a:rPr lang="en-NZ" sz="2800" b="1" dirty="0">
-                <a:latin typeface="Consolas" panose="020B0609020204030204" pitchFamily="49" charset="0"/>
-                <a:cs typeface="Consolas" panose="020B0609020204030204" pitchFamily="49" charset="0"/>
-              </a:rPr>
-              <a:t>();</a:t>
+              <a:t>years.Product</a:t>
+            </a:r>
+            <a:r>
+              <a:rPr lang="en-NZ" sz="2800" b="1" dirty="0">
+                <a:latin typeface="Consolas" panose="020B0609020204030204" pitchFamily="49" charset="0"/>
+                <a:cs typeface="Consolas" panose="020B0609020204030204" pitchFamily="49" charset="0"/>
+              </a:rPr>
+              <a:t>(y =&gt; </a:t>
+            </a:r>
+            <a:r>
+              <a:rPr lang="en-NZ" sz="2800" b="1" dirty="0" err="1">
+                <a:latin typeface="Consolas" panose="020B0609020204030204" pitchFamily="49" charset="0"/>
+                <a:cs typeface="Consolas" panose="020B0609020204030204" pitchFamily="49" charset="0"/>
+              </a:rPr>
+              <a:t>y.AnnualInflation</a:t>
+            </a:r>
+            <a:r>
+              <a:rPr lang="en-NZ" sz="2800" b="1" dirty="0">
+                <a:latin typeface="Consolas" panose="020B0609020204030204" pitchFamily="49" charset="0"/>
+                <a:cs typeface="Consolas" panose="020B0609020204030204" pitchFamily="49" charset="0"/>
+              </a:rPr>
+              <a:t>);</a:t>
             </a:r>
           </a:p>
           <a:p>
@@ -7325,7 +7348,7 @@
                 <a:latin typeface="Consolas" panose="020B0609020204030204" pitchFamily="49" charset="0"/>
                 <a:cs typeface="Consolas" panose="020B0609020204030204" pitchFamily="49" charset="0"/>
               </a:rPr>
-              <a:t>scores.Aggregate</a:t>
+              <a:t>years.Aggregate</a:t>
             </a:r>
             <a:r>
               <a:rPr lang="en-NZ" sz="2800" b="1" dirty="0">
@@ -7346,16 +7369,16 @@
                 <a:latin typeface="Consolas" panose="020B0609020204030204" pitchFamily="49" charset="0"/>
                 <a:cs typeface="Consolas" panose="020B0609020204030204" pitchFamily="49" charset="0"/>
               </a:rPr>
-              <a:t>, s) =&gt;</a:t>
-            </a:r>
-          </a:p>
-          <a:p>
-            <a:r>
-              <a:rPr lang="en-NZ" sz="2800" b="1" dirty="0">
-                <a:latin typeface="Consolas" panose="020B0609020204030204" pitchFamily="49" charset="0"/>
-                <a:cs typeface="Consolas" panose="020B0609020204030204" pitchFamily="49" charset="0"/>
-              </a:rPr>
-              <a:t>  Max(</a:t>
+              <a:t>, y) =&gt;</a:t>
+            </a:r>
+          </a:p>
+          <a:p>
+            <a:r>
+              <a:rPr lang="en-NZ" sz="2800" b="1" dirty="0">
+                <a:latin typeface="Consolas" panose="020B0609020204030204" pitchFamily="49" charset="0"/>
+                <a:cs typeface="Consolas" panose="020B0609020204030204" pitchFamily="49" charset="0"/>
+              </a:rPr>
+              <a:t>  </a:t>
             </a:r>
             <a:r>
               <a:rPr lang="en-NZ" sz="2800" b="1" dirty="0" err="1">
@@ -7369,7 +7392,21 @@
                 <a:latin typeface="Consolas" panose="020B0609020204030204" pitchFamily="49" charset="0"/>
                 <a:cs typeface="Consolas" panose="020B0609020204030204" pitchFamily="49" charset="0"/>
               </a:rPr>
-              <a:t>, s));</a:t>
+              <a:t> * </a:t>
+            </a:r>
+            <a:r>
+              <a:rPr lang="en-NZ" sz="2800" b="1" dirty="0" err="1">
+                <a:latin typeface="Consolas" panose="020B0609020204030204" pitchFamily="49" charset="0"/>
+                <a:cs typeface="Consolas" panose="020B0609020204030204" pitchFamily="49" charset="0"/>
+              </a:rPr>
+              <a:t>y.AnnualInflation</a:t>
+            </a:r>
+            <a:r>
+              <a:rPr lang="en-NZ" sz="2800" b="1" dirty="0">
+                <a:latin typeface="Consolas" panose="020B0609020204030204" pitchFamily="49" charset="0"/>
+                <a:cs typeface="Consolas" panose="020B0609020204030204" pitchFamily="49" charset="0"/>
+              </a:rPr>
+              <a:t>);</a:t>
             </a:r>
           </a:p>
         </p:txBody>
@@ -7444,7 +7481,7 @@
     </p:spTree>
     <p:extLst>
       <p:ext uri="{BB962C8B-B14F-4D97-AF65-F5344CB8AC3E}">
-        <p14:creationId xmlns:p14="http://schemas.microsoft.com/office/powerpoint/2010/main" val="3379158450"/>
+        <p14:creationId xmlns:p14="http://schemas.microsoft.com/office/powerpoint/2010/main" val="431260941"/>
       </p:ext>
     </p:extLst>
   </p:cSld>
@@ -7476,43 +7513,14 @@
       </p:grpSpPr>
       <p:sp>
         <p:nvSpPr>
-          <p:cNvPr id="3" name="TextBox 2"/>
+          <p:cNvPr id="6" name="TextBox 5"/>
           <p:cNvSpPr txBox="1"/>
           <p:nvPr/>
         </p:nvSpPr>
         <p:spPr>
           <a:xfrm>
-            <a:off x="683568" y="555526"/>
-            <a:ext cx="7848872" cy="646331"/>
-          </a:xfrm>
-          <a:prstGeom prst="rect">
-            <a:avLst/>
-          </a:prstGeom>
-          <a:noFill/>
-        </p:spPr>
-        <p:txBody>
-          <a:bodyPr wrap="square" rtlCol="0">
-            <a:spAutoFit/>
-          </a:bodyPr>
-          <a:lstStyle/>
-          <a:p>
-            <a:r>
-              <a:rPr lang="en-NZ" sz="3600" b="1" dirty="0"/>
-              <a:t>Abstractions… of abstractions</a:t>
-            </a:r>
-          </a:p>
-        </p:txBody>
-      </p:sp>
-      <p:sp>
-        <p:nvSpPr>
-          <p:cNvPr id="5" name="TextBox 4"/>
-          <p:cNvSpPr txBox="1"/>
-          <p:nvPr/>
-        </p:nvSpPr>
-        <p:spPr>
-          <a:xfrm>
             <a:off x="683568" y="1478270"/>
-            <a:ext cx="7848872" cy="3108543"/>
+            <a:ext cx="7848872" cy="2677656"/>
           </a:xfrm>
           <a:prstGeom prst="rect">
             <a:avLst/>
@@ -7530,51 +7538,14 @@
                 <a:latin typeface="Consolas" panose="020B0609020204030204" pitchFamily="49" charset="0"/>
                 <a:cs typeface="Consolas" panose="020B0609020204030204" pitchFamily="49" charset="0"/>
               </a:rPr>
-              <a:t>foreach</a:t>
-            </a:r>
-            <a:r>
-              <a:rPr lang="en-NZ" sz="2800" b="1" dirty="0">
-                <a:latin typeface="Consolas" panose="020B0609020204030204" pitchFamily="49" charset="0"/>
-                <a:cs typeface="Consolas" panose="020B0609020204030204" pitchFamily="49" charset="0"/>
-              </a:rPr>
-              <a:t> (</a:t>
-            </a:r>
-            <a:r>
-              <a:rPr lang="en-NZ" sz="2800" b="1" dirty="0" err="1">
-                <a:latin typeface="Consolas" panose="020B0609020204030204" pitchFamily="49" charset="0"/>
-                <a:cs typeface="Consolas" panose="020B0609020204030204" pitchFamily="49" charset="0"/>
-              </a:rPr>
-              <a:t>var</a:t>
-            </a:r>
-            <a:r>
-              <a:rPr lang="en-NZ" sz="2800" b="1" dirty="0">
-                <a:latin typeface="Consolas" panose="020B0609020204030204" pitchFamily="49" charset="0"/>
-                <a:cs typeface="Consolas" panose="020B0609020204030204" pitchFamily="49" charset="0"/>
-              </a:rPr>
-              <a:t> w in words)</a:t>
-            </a:r>
-          </a:p>
-          <a:p>
-            <a:r>
-              <a:rPr lang="en-NZ" sz="2800" b="1" dirty="0">
-                <a:latin typeface="Consolas" panose="020B0609020204030204" pitchFamily="49" charset="0"/>
-                <a:cs typeface="Consolas" panose="020B0609020204030204" pitchFamily="49" charset="0"/>
-              </a:rPr>
-              <a:t>  </a:t>
-            </a:r>
-            <a:r>
-              <a:rPr lang="en-NZ" sz="2800" b="1" dirty="0" err="1">
-                <a:latin typeface="Consolas" panose="020B0609020204030204" pitchFamily="49" charset="0"/>
-                <a:cs typeface="Consolas" panose="020B0609020204030204" pitchFamily="49" charset="0"/>
-              </a:rPr>
-              <a:t>endlessBabble</a:t>
-            </a:r>
-            <a:r>
-              <a:rPr lang="en-NZ" sz="2800" b="1" dirty="0">
-                <a:latin typeface="Consolas" panose="020B0609020204030204" pitchFamily="49" charset="0"/>
-                <a:cs typeface="Consolas" panose="020B0609020204030204" pitchFamily="49" charset="0"/>
-              </a:rPr>
-              <a:t> += w + " ";</a:t>
+              <a:t>scores.Max</a:t>
+            </a:r>
+            <a:r>
+              <a:rPr lang="en-NZ" sz="2800" b="1" dirty="0">
+                <a:latin typeface="Consolas" panose="020B0609020204030204" pitchFamily="49" charset="0"/>
+                <a:cs typeface="Consolas" panose="020B0609020204030204" pitchFamily="49" charset="0"/>
+              </a:rPr>
+              <a:t>();</a:t>
             </a:r>
           </a:p>
           <a:p>
@@ -7601,7 +7572,7 @@
                 <a:latin typeface="Consolas" panose="020B0609020204030204" pitchFamily="49" charset="0"/>
                 <a:cs typeface="Consolas" panose="020B0609020204030204" pitchFamily="49" charset="0"/>
               </a:rPr>
-              <a:t>words.Aggregate</a:t>
+              <a:t>scores.Aggregate</a:t>
             </a:r>
             <a:r>
               <a:rPr lang="en-NZ" sz="2800" b="1" dirty="0">
@@ -7622,16 +7593,16 @@
                 <a:latin typeface="Consolas" panose="020B0609020204030204" pitchFamily="49" charset="0"/>
                 <a:cs typeface="Consolas" panose="020B0609020204030204" pitchFamily="49" charset="0"/>
               </a:rPr>
-              <a:t>, w) =&gt;</a:t>
-            </a:r>
-          </a:p>
-          <a:p>
-            <a:r>
-              <a:rPr lang="en-NZ" sz="2800" b="1" dirty="0">
-                <a:latin typeface="Consolas" panose="020B0609020204030204" pitchFamily="49" charset="0"/>
-                <a:cs typeface="Consolas" panose="020B0609020204030204" pitchFamily="49" charset="0"/>
-              </a:rPr>
-              <a:t>  </a:t>
+              <a:t>, s) =&gt;</a:t>
+            </a:r>
+          </a:p>
+          <a:p>
+            <a:r>
+              <a:rPr lang="en-NZ" sz="2800" b="1" dirty="0">
+                <a:latin typeface="Consolas" panose="020B0609020204030204" pitchFamily="49" charset="0"/>
+                <a:cs typeface="Consolas" panose="020B0609020204030204" pitchFamily="49" charset="0"/>
+              </a:rPr>
+              <a:t>  Max(</a:t>
             </a:r>
             <a:r>
               <a:rPr lang="en-NZ" sz="2800" b="1" dirty="0" err="1">
@@ -7645,20 +7616,49 @@
                 <a:latin typeface="Consolas" panose="020B0609020204030204" pitchFamily="49" charset="0"/>
                 <a:cs typeface="Consolas" panose="020B0609020204030204" pitchFamily="49" charset="0"/>
               </a:rPr>
-              <a:t> + w + " ");</a:t>
-            </a:r>
-          </a:p>
-        </p:txBody>
-      </p:sp>
-      <p:sp>
-        <p:nvSpPr>
-          <p:cNvPr id="7" name="Down Arrow 6"/>
+              <a:t>, s));</a:t>
+            </a:r>
+          </a:p>
+        </p:txBody>
+      </p:sp>
+      <p:sp>
+        <p:nvSpPr>
+          <p:cNvPr id="3" name="TextBox 2"/>
+          <p:cNvSpPr txBox="1"/>
+          <p:nvPr/>
+        </p:nvSpPr>
+        <p:spPr>
+          <a:xfrm>
+            <a:off x="683568" y="555526"/>
+            <a:ext cx="7848872" cy="646331"/>
+          </a:xfrm>
+          <a:prstGeom prst="rect">
+            <a:avLst/>
+          </a:prstGeom>
+          <a:noFill/>
+        </p:spPr>
+        <p:txBody>
+          <a:bodyPr wrap="square" rtlCol="0">
+            <a:spAutoFit/>
+          </a:bodyPr>
+          <a:lstStyle/>
+          <a:p>
+            <a:r>
+              <a:rPr lang="en-NZ" sz="3600" b="1" dirty="0"/>
+              <a:t>Abstractions… of abstractions</a:t>
+            </a:r>
+          </a:p>
+        </p:txBody>
+      </p:sp>
+      <p:sp>
+        <p:nvSpPr>
+          <p:cNvPr id="2" name="Down Arrow 1"/>
           <p:cNvSpPr/>
           <p:nvPr/>
         </p:nvSpPr>
         <p:spPr>
           <a:xfrm>
-            <a:off x="4283968" y="2715766"/>
+            <a:off x="4283968" y="2283718"/>
             <a:ext cx="576064" cy="648072"/>
           </a:xfrm>
           <a:prstGeom prst="downArrow">
@@ -7691,7 +7691,7 @@
     </p:spTree>
     <p:extLst>
       <p:ext uri="{BB962C8B-B14F-4D97-AF65-F5344CB8AC3E}">
-        <p14:creationId xmlns:p14="http://schemas.microsoft.com/office/powerpoint/2010/main" val="2914714035"/>
+        <p14:creationId xmlns:p14="http://schemas.microsoft.com/office/powerpoint/2010/main" val="3379158450"/>
       </p:ext>
     </p:extLst>
   </p:cSld>
@@ -7798,30 +7798,30 @@
                 <a:latin typeface="Consolas" panose="020B0609020204030204" pitchFamily="49" charset="0"/>
                 <a:cs typeface="Consolas" panose="020B0609020204030204" pitchFamily="49" charset="0"/>
               </a:rPr>
-              <a:t> x in </a:t>
+              <a:t> w in words)</a:t>
+            </a:r>
+          </a:p>
+          <a:p>
+            <a:r>
+              <a:rPr lang="en-NZ" sz="2800" b="1" dirty="0">
+                <a:latin typeface="Consolas" panose="020B0609020204030204" pitchFamily="49" charset="0"/>
+                <a:cs typeface="Consolas" panose="020B0609020204030204" pitchFamily="49" charset="0"/>
+              </a:rPr>
+              <a:t>  </a:t>
             </a:r>
             <a:r>
               <a:rPr lang="en-NZ" sz="2800" b="1" dirty="0" err="1">
                 <a:latin typeface="Consolas" panose="020B0609020204030204" pitchFamily="49" charset="0"/>
                 <a:cs typeface="Consolas" panose="020B0609020204030204" pitchFamily="49" charset="0"/>
               </a:rPr>
-              <a:t>xs</a:t>
-            </a:r>
-            <a:r>
-              <a:rPr lang="en-NZ" sz="2800" b="1" dirty="0">
-                <a:latin typeface="Consolas" panose="020B0609020204030204" pitchFamily="49" charset="0"/>
-                <a:cs typeface="Consolas" panose="020B0609020204030204" pitchFamily="49" charset="0"/>
-              </a:rPr>
-              <a:t>)</a:t>
-            </a:r>
-          </a:p>
-          <a:p>
-            <a:r>
-              <a:rPr lang="en-NZ" sz="2800" b="1" dirty="0">
-                <a:latin typeface="Consolas" panose="020B0609020204030204" pitchFamily="49" charset="0"/>
-                <a:cs typeface="Consolas" panose="020B0609020204030204" pitchFamily="49" charset="0"/>
-              </a:rPr>
-              <a:t>  result = f(result, x);</a:t>
+              <a:t>endlessBabble</a:t>
+            </a:r>
+            <a:r>
+              <a:rPr lang="en-NZ" sz="2800" b="1" dirty="0">
+                <a:latin typeface="Consolas" panose="020B0609020204030204" pitchFamily="49" charset="0"/>
+                <a:cs typeface="Consolas" panose="020B0609020204030204" pitchFamily="49" charset="0"/>
+              </a:rPr>
+              <a:t> += w + " ";</a:t>
             </a:r>
           </a:p>
           <a:p>
@@ -7848,7 +7848,7 @@
                 <a:latin typeface="Consolas" panose="020B0609020204030204" pitchFamily="49" charset="0"/>
                 <a:cs typeface="Consolas" panose="020B0609020204030204" pitchFamily="49" charset="0"/>
               </a:rPr>
-              <a:t>xs.Aggregate</a:t>
+              <a:t>words.Aggregate</a:t>
             </a:r>
             <a:r>
               <a:rPr lang="en-NZ" sz="2800" b="1" dirty="0">
@@ -7878,7 +7878,7 @@
                 <a:latin typeface="Consolas" panose="020B0609020204030204" pitchFamily="49" charset="0"/>
                 <a:cs typeface="Consolas" panose="020B0609020204030204" pitchFamily="49" charset="0"/>
               </a:rPr>
-              <a:t>  f(</a:t>
+              <a:t>  </a:t>
             </a:r>
             <a:r>
               <a:rPr lang="en-NZ" sz="2800" b="1" dirty="0" err="1">
@@ -7892,7 +7892,7 @@
                 <a:latin typeface="Consolas" panose="020B0609020204030204" pitchFamily="49" charset="0"/>
                 <a:cs typeface="Consolas" panose="020B0609020204030204" pitchFamily="49" charset="0"/>
               </a:rPr>
-              <a:t>, w));</a:t>
+              <a:t> + w + " ");</a:t>
             </a:r>
           </a:p>
         </p:txBody>
@@ -7938,7 +7938,7 @@
     </p:spTree>
     <p:extLst>
       <p:ext uri="{BB962C8B-B14F-4D97-AF65-F5344CB8AC3E}">
-        <p14:creationId xmlns:p14="http://schemas.microsoft.com/office/powerpoint/2010/main" val="2055917948"/>
+        <p14:creationId xmlns:p14="http://schemas.microsoft.com/office/powerpoint/2010/main" val="2914714035"/>
       </p:ext>
     </p:extLst>
   </p:cSld>
@@ -12721,7 +12721,7 @@
                 <a:latin typeface="Consolas" panose="020B0609020204030204" pitchFamily="49" charset="0"/>
                 <a:cs typeface="Consolas" panose="020B0609020204030204" pitchFamily="49" charset="0"/>
               </a:rPr>
-              <a:t>f</a:t>
+              <a:t>F</a:t>
             </a:r>
             <a:r>
               <a:rPr lang="en-NZ" sz="2800" b="1" dirty="0">
@@ -12805,7 +12805,7 @@
             <a:pPr algn="ctr"/>
             <a:r>
               <a:rPr lang="en-NZ" sz="4000" b="1" dirty="0" err="1"/>
-              <a:t>MappableInAWayThatPreservesStructure</a:t>
+              <a:t>IHasStructurePreservingMap</a:t>
             </a:r>
             <a:endParaRPr lang="en-NZ" sz="4000" b="1" dirty="0"/>
           </a:p>
@@ -14141,41 +14141,79 @@
               <a:t>&lt;</a:t>
             </a:r>
             <a:r>
+              <a:rPr lang="en-NZ" sz="2800" b="1" dirty="0">
+                <a:solidFill>
+                  <a:schemeClr val="accent1"/>
+                </a:solidFill>
+                <a:latin typeface="Consolas" panose="020B0609020204030204" pitchFamily="49" charset="0"/>
+                <a:cs typeface="Consolas" panose="020B0609020204030204" pitchFamily="49" charset="0"/>
+              </a:rPr>
+              <a:t>seq</a:t>
+            </a:r>
+            <a:r>
+              <a:rPr lang="en-NZ" sz="2800" b="1" dirty="0">
+                <a:latin typeface="Consolas" panose="020B0609020204030204" pitchFamily="49" charset="0"/>
+                <a:cs typeface="Consolas" panose="020B0609020204030204" pitchFamily="49" charset="0"/>
+              </a:rPr>
+              <a:t>&lt;T&gt;,   </a:t>
+            </a:r>
+            <a:r>
+              <a:rPr lang="en-NZ" sz="2800" b="1" dirty="0">
+                <a:solidFill>
+                  <a:schemeClr val="accent1"/>
+                </a:solidFill>
+                <a:latin typeface="Consolas" panose="020B0609020204030204" pitchFamily="49" charset="0"/>
+                <a:cs typeface="Consolas" panose="020B0609020204030204" pitchFamily="49" charset="0"/>
+              </a:rPr>
+              <a:t>seq</a:t>
+            </a:r>
+            <a:r>
+              <a:rPr lang="en-NZ" sz="2800" b="1" dirty="0">
+                <a:latin typeface="Consolas" panose="020B0609020204030204" pitchFamily="49" charset="0"/>
+                <a:cs typeface="Consolas" panose="020B0609020204030204" pitchFamily="49" charset="0"/>
+              </a:rPr>
+              <a:t>&lt;U&gt;&gt;</a:t>
+            </a:r>
+          </a:p>
+          <a:p>
+            <a:r>
+              <a:rPr lang="en-NZ" sz="2800" b="1" dirty="0">
+                <a:solidFill>
+                  <a:schemeClr val="accent2"/>
+                </a:solidFill>
+                <a:latin typeface="Consolas" panose="020B0609020204030204" pitchFamily="49" charset="0"/>
+                <a:cs typeface="Consolas" panose="020B0609020204030204" pitchFamily="49" charset="0"/>
+              </a:rPr>
+              <a:t>map: </a:t>
+            </a:r>
+            <a:r>
               <a:rPr lang="en-NZ" sz="2800" b="1" dirty="0" err="1">
-                <a:solidFill>
-                  <a:schemeClr val="accent1"/>
-                </a:solidFill>
-                <a:latin typeface="Consolas" panose="020B0609020204030204" pitchFamily="49" charset="0"/>
-                <a:cs typeface="Consolas" panose="020B0609020204030204" pitchFamily="49" charset="0"/>
-              </a:rPr>
-              <a:t>seq</a:t>
-            </a:r>
-            <a:r>
-              <a:rPr lang="en-NZ" sz="2800" b="1" dirty="0">
-                <a:latin typeface="Consolas" panose="020B0609020204030204" pitchFamily="49" charset="0"/>
-                <a:cs typeface="Consolas" panose="020B0609020204030204" pitchFamily="49" charset="0"/>
-              </a:rPr>
-              <a:t>&lt;T&gt;, </a:t>
+                <a:latin typeface="Consolas" panose="020B0609020204030204" pitchFamily="49" charset="0"/>
+                <a:cs typeface="Consolas" panose="020B0609020204030204" pitchFamily="49" charset="0"/>
+              </a:rPr>
+              <a:t>func</a:t>
+            </a:r>
+            <a:r>
+              <a:rPr lang="en-NZ" sz="2800" b="1" dirty="0">
+                <a:latin typeface="Consolas" panose="020B0609020204030204" pitchFamily="49" charset="0"/>
+                <a:cs typeface="Consolas" panose="020B0609020204030204" pitchFamily="49" charset="0"/>
+              </a:rPr>
+              <a:t>&lt;T,U&gt; -&gt; </a:t>
             </a:r>
             <a:r>
               <a:rPr lang="en-NZ" sz="2800" b="1" dirty="0" err="1">
-                <a:solidFill>
-                  <a:schemeClr val="accent1"/>
-                </a:solidFill>
-                <a:latin typeface="Consolas" panose="020B0609020204030204" pitchFamily="49" charset="0"/>
-                <a:cs typeface="Consolas" panose="020B0609020204030204" pitchFamily="49" charset="0"/>
-              </a:rPr>
-              <a:t>seq</a:t>
-            </a:r>
-            <a:r>
-              <a:rPr lang="en-NZ" sz="2800" b="1" dirty="0">
-                <a:latin typeface="Consolas" panose="020B0609020204030204" pitchFamily="49" charset="0"/>
-                <a:cs typeface="Consolas" panose="020B0609020204030204" pitchFamily="49" charset="0"/>
-              </a:rPr>
-              <a:t>&lt;U&gt;&gt;</a:t>
-            </a:r>
-          </a:p>
-          <a:p>
+                <a:latin typeface="Consolas" panose="020B0609020204030204" pitchFamily="49" charset="0"/>
+                <a:cs typeface="Consolas" panose="020B0609020204030204" pitchFamily="49" charset="0"/>
+              </a:rPr>
+              <a:t>func</a:t>
+            </a:r>
+            <a:r>
+              <a:rPr lang="en-NZ" sz="2800" b="1" dirty="0">
+                <a:latin typeface="Consolas" panose="020B0609020204030204" pitchFamily="49" charset="0"/>
+                <a:cs typeface="Consolas" panose="020B0609020204030204" pitchFamily="49" charset="0"/>
+              </a:rPr>
+              <a:t>&lt;</a:t>
+            </a:r>
             <a:r>
               <a:rPr lang="en-NZ" sz="2800" b="1" dirty="0">
                 <a:solidFill>
@@ -14184,44 +14222,6 @@
                 <a:latin typeface="Consolas" panose="020B0609020204030204" pitchFamily="49" charset="0"/>
                 <a:cs typeface="Consolas" panose="020B0609020204030204" pitchFamily="49" charset="0"/>
               </a:rPr>
-              <a:t>map: </a:t>
-            </a:r>
-            <a:r>
-              <a:rPr lang="en-NZ" sz="2800" b="1" dirty="0" err="1">
-                <a:latin typeface="Consolas" panose="020B0609020204030204" pitchFamily="49" charset="0"/>
-                <a:cs typeface="Consolas" panose="020B0609020204030204" pitchFamily="49" charset="0"/>
-              </a:rPr>
-              <a:t>func</a:t>
-            </a:r>
-            <a:r>
-              <a:rPr lang="en-NZ" sz="2800" b="1" dirty="0">
-                <a:latin typeface="Consolas" panose="020B0609020204030204" pitchFamily="49" charset="0"/>
-                <a:cs typeface="Consolas" panose="020B0609020204030204" pitchFamily="49" charset="0"/>
-              </a:rPr>
-              <a:t>&lt;T,U&gt; -&gt; </a:t>
-            </a:r>
-            <a:r>
-              <a:rPr lang="en-NZ" sz="2800" b="1" dirty="0" err="1">
-                <a:latin typeface="Consolas" panose="020B0609020204030204" pitchFamily="49" charset="0"/>
-                <a:cs typeface="Consolas" panose="020B0609020204030204" pitchFamily="49" charset="0"/>
-              </a:rPr>
-              <a:t>func</a:t>
-            </a:r>
-            <a:r>
-              <a:rPr lang="en-NZ" sz="2800" b="1" dirty="0">
-                <a:latin typeface="Consolas" panose="020B0609020204030204" pitchFamily="49" charset="0"/>
-                <a:cs typeface="Consolas" panose="020B0609020204030204" pitchFamily="49" charset="0"/>
-              </a:rPr>
-              <a:t>&lt;</a:t>
-            </a:r>
-            <a:r>
-              <a:rPr lang="en-NZ" sz="2800" b="1" dirty="0">
-                <a:solidFill>
-                  <a:schemeClr val="accent2"/>
-                </a:solidFill>
-                <a:latin typeface="Consolas" panose="020B0609020204030204" pitchFamily="49" charset="0"/>
-                <a:cs typeface="Consolas" panose="020B0609020204030204" pitchFamily="49" charset="0"/>
-              </a:rPr>
               <a:t>tree</a:t>
             </a:r>
             <a:r>
@@ -14229,7 +14229,7 @@
                 <a:latin typeface="Consolas" panose="020B0609020204030204" pitchFamily="49" charset="0"/>
                 <a:cs typeface="Consolas" panose="020B0609020204030204" pitchFamily="49" charset="0"/>
               </a:rPr>
-              <a:t>&lt;T&gt;, </a:t>
+              <a:t>&lt;T&gt;,  </a:t>
             </a:r>
             <a:r>
               <a:rPr lang="en-NZ" sz="2800" b="1" dirty="0">

</xml_diff>